<commit_message>
Added sql scripts and update ppt
</commit_message>
<xml_diff>
--- a/RateMySlumlord-FinalDemo.pptx
+++ b/RateMySlumlord-FinalDemo.pptx
@@ -11,7 +11,8 @@
     <p:sldId id="271" r:id="rId5"/>
     <p:sldId id="269" r:id="rId6"/>
     <p:sldId id="273" r:id="rId7"/>
-    <p:sldId id="272" r:id="rId8"/>
+    <p:sldId id="274" r:id="rId8"/>
+    <p:sldId id="272" r:id="rId9"/>
   </p:sldIdLst>
   <p:sldSz cx="12192000" cy="6858000"/>
   <p:notesSz cx="6858000" cy="9144000"/>
@@ -118,6 +119,144 @@
 </p:presentation>
 </file>
 
+<file path=ppt/revisionInfo.xml><?xml version="1.0" encoding="utf-8"?>
+<p1510:revInfo xmlns:a="http://schemas.openxmlformats.org/drawingml/2006/main" xmlns:r="http://schemas.openxmlformats.org/officeDocument/2006/relationships" xmlns:p1510="http://schemas.microsoft.com/office/powerpoint/2015/10/main">
+  <p1510:revLst>
+    <p1510:client id="{29A24B01-D7CF-4131-AF57-FF1E362A4B26}" v="107" dt="2019-07-31T16:46:04.471"/>
+  </p1510:revLst>
+</p1510:revInfo>
+</file>
+
+<file path=ppt/changesInfos/changesInfo1.xml><?xml version="1.0" encoding="utf-8"?>
+<pc:chgInfo xmlns:a="http://schemas.openxmlformats.org/drawingml/2006/main" xmlns:r="http://schemas.openxmlformats.org/officeDocument/2006/relationships" xmlns:ac="http://schemas.microsoft.com/office/drawing/2013/main/command" xmlns:pc="http://schemas.microsoft.com/office/powerpoint/2013/main/command">
+  <pc:docChgLst>
+    <pc:chgData name="Matt Gabrin" userId="686dd4d528919795" providerId="LiveId" clId="{29A24B01-D7CF-4131-AF57-FF1E362A4B26}"/>
+    <pc:docChg chg="undo custSel addSld modSld">
+      <pc:chgData name="Matt Gabrin" userId="686dd4d528919795" providerId="LiveId" clId="{29A24B01-D7CF-4131-AF57-FF1E362A4B26}" dt="2019-07-31T16:46:20.197" v="316" actId="20577"/>
+      <pc:docMkLst>
+        <pc:docMk/>
+      </pc:docMkLst>
+      <pc:sldChg chg="modSp modAnim">
+        <pc:chgData name="Matt Gabrin" userId="686dd4d528919795" providerId="LiveId" clId="{29A24B01-D7CF-4131-AF57-FF1E362A4B26}" dt="2019-07-31T16:36:02.381" v="89" actId="20577"/>
+        <pc:sldMkLst>
+          <pc:docMk/>
+          <pc:sldMk cId="2770911967" sldId="258"/>
+        </pc:sldMkLst>
+        <pc:spChg chg="mod">
+          <ac:chgData name="Matt Gabrin" userId="686dd4d528919795" providerId="LiveId" clId="{29A24B01-D7CF-4131-AF57-FF1E362A4B26}" dt="2019-07-31T16:36:02.381" v="89" actId="20577"/>
+          <ac:spMkLst>
+            <pc:docMk/>
+            <pc:sldMk cId="2770911967" sldId="258"/>
+            <ac:spMk id="3" creationId="{98E86E6B-94B1-495B-90AD-818255EE2D37}"/>
+          </ac:spMkLst>
+        </pc:spChg>
+      </pc:sldChg>
+      <pc:sldChg chg="addSp modSp">
+        <pc:chgData name="Matt Gabrin" userId="686dd4d528919795" providerId="LiveId" clId="{29A24B01-D7CF-4131-AF57-FF1E362A4B26}" dt="2019-07-31T16:46:04.471" v="312" actId="1076"/>
+        <pc:sldMkLst>
+          <pc:docMk/>
+          <pc:sldMk cId="46943841" sldId="269"/>
+        </pc:sldMkLst>
+        <pc:picChg chg="add">
+          <ac:chgData name="Matt Gabrin" userId="686dd4d528919795" providerId="LiveId" clId="{29A24B01-D7CF-4131-AF57-FF1E362A4B26}" dt="2019-07-31T16:46:02.031" v="311"/>
+          <ac:picMkLst>
+            <pc:docMk/>
+            <pc:sldMk cId="46943841" sldId="269"/>
+            <ac:picMk id="5" creationId="{DF47BB68-AFAE-44D1-B6ED-9B6F973F2520}"/>
+          </ac:picMkLst>
+        </pc:picChg>
+        <pc:picChg chg="mod">
+          <ac:chgData name="Matt Gabrin" userId="686dd4d528919795" providerId="LiveId" clId="{29A24B01-D7CF-4131-AF57-FF1E362A4B26}" dt="2019-07-31T16:46:04.471" v="312" actId="1076"/>
+          <ac:picMkLst>
+            <pc:docMk/>
+            <pc:sldMk cId="46943841" sldId="269"/>
+            <ac:picMk id="2050" creationId="{282374A3-63CD-4D72-ABD2-4B9F1A944E5D}"/>
+          </ac:picMkLst>
+        </pc:picChg>
+      </pc:sldChg>
+      <pc:sldChg chg="addSp modSp">
+        <pc:chgData name="Matt Gabrin" userId="686dd4d528919795" providerId="LiveId" clId="{29A24B01-D7CF-4131-AF57-FF1E362A4B26}" dt="2019-07-31T16:45:58.278" v="309" actId="1076"/>
+        <pc:sldMkLst>
+          <pc:docMk/>
+          <pc:sldMk cId="1946155254" sldId="273"/>
+        </pc:sldMkLst>
+        <pc:picChg chg="add">
+          <ac:chgData name="Matt Gabrin" userId="686dd4d528919795" providerId="LiveId" clId="{29A24B01-D7CF-4131-AF57-FF1E362A4B26}" dt="2019-07-31T16:45:54.275" v="307"/>
+          <ac:picMkLst>
+            <pc:docMk/>
+            <pc:sldMk cId="1946155254" sldId="273"/>
+            <ac:picMk id="5" creationId="{53C5CEE3-0633-47B2-834D-526F4970743A}"/>
+          </ac:picMkLst>
+        </pc:picChg>
+        <pc:picChg chg="mod">
+          <ac:chgData name="Matt Gabrin" userId="686dd4d528919795" providerId="LiveId" clId="{29A24B01-D7CF-4131-AF57-FF1E362A4B26}" dt="2019-07-31T16:45:58.278" v="309" actId="1076"/>
+          <ac:picMkLst>
+            <pc:docMk/>
+            <pc:sldMk cId="1946155254" sldId="273"/>
+            <ac:picMk id="1026" creationId="{98C41F0C-9500-498F-AD70-91E0078F0C09}"/>
+          </ac:picMkLst>
+        </pc:picChg>
+      </pc:sldChg>
+      <pc:sldChg chg="addSp modSp add">
+        <pc:chgData name="Matt Gabrin" userId="686dd4d528919795" providerId="LiveId" clId="{29A24B01-D7CF-4131-AF57-FF1E362A4B26}" dt="2019-07-31T16:46:20.197" v="316" actId="20577"/>
+        <pc:sldMkLst>
+          <pc:docMk/>
+          <pc:sldMk cId="1015099582" sldId="274"/>
+        </pc:sldMkLst>
+        <pc:spChg chg="mod">
+          <ac:chgData name="Matt Gabrin" userId="686dd4d528919795" providerId="LiveId" clId="{29A24B01-D7CF-4131-AF57-FF1E362A4B26}" dt="2019-07-31T16:38:10.209" v="108" actId="20577"/>
+          <ac:spMkLst>
+            <pc:docMk/>
+            <pc:sldMk cId="1015099582" sldId="274"/>
+            <ac:spMk id="2" creationId="{73796899-DAB3-494A-98EE-6D8675752523}"/>
+          </ac:spMkLst>
+        </pc:spChg>
+        <pc:spChg chg="mod">
+          <ac:chgData name="Matt Gabrin" userId="686dd4d528919795" providerId="LiveId" clId="{29A24B01-D7CF-4131-AF57-FF1E362A4B26}" dt="2019-07-31T16:45:25.961" v="304" actId="403"/>
+          <ac:spMkLst>
+            <pc:docMk/>
+            <pc:sldMk cId="1015099582" sldId="274"/>
+            <ac:spMk id="3" creationId="{1F5FCD82-D14D-4E3B-95CB-BAC77912A17A}"/>
+          </ac:spMkLst>
+        </pc:spChg>
+        <pc:spChg chg="add mod">
+          <ac:chgData name="Matt Gabrin" userId="686dd4d528919795" providerId="LiveId" clId="{29A24B01-D7CF-4131-AF57-FF1E362A4B26}" dt="2019-07-31T16:45:33.520" v="305" actId="403"/>
+          <ac:spMkLst>
+            <pc:docMk/>
+            <pc:sldMk cId="1015099582" sldId="274"/>
+            <ac:spMk id="4" creationId="{A304C36F-F012-40B4-9077-E7C13CF63058}"/>
+          </ac:spMkLst>
+        </pc:spChg>
+        <pc:spChg chg="add mod">
+          <ac:chgData name="Matt Gabrin" userId="686dd4d528919795" providerId="LiveId" clId="{29A24B01-D7CF-4131-AF57-FF1E362A4B26}" dt="2019-07-31T16:46:20.197" v="316" actId="20577"/>
+          <ac:spMkLst>
+            <pc:docMk/>
+            <pc:sldMk cId="1015099582" sldId="274"/>
+            <ac:spMk id="5" creationId="{6E45F526-CECD-42FD-B5E1-969D6F973932}"/>
+          </ac:spMkLst>
+        </pc:spChg>
+        <pc:spChg chg="add mod">
+          <ac:chgData name="Matt Gabrin" userId="686dd4d528919795" providerId="LiveId" clId="{29A24B01-D7CF-4131-AF57-FF1E362A4B26}" dt="2019-07-31T16:44:06.913" v="297" actId="1076"/>
+          <ac:spMkLst>
+            <pc:docMk/>
+            <pc:sldMk cId="1015099582" sldId="274"/>
+            <ac:spMk id="6" creationId="{63CEAFBF-DB44-43DD-A599-6546C19B5A4B}"/>
+          </ac:spMkLst>
+        </pc:spChg>
+        <pc:picChg chg="add">
+          <ac:chgData name="Matt Gabrin" userId="686dd4d528919795" providerId="LiveId" clId="{29A24B01-D7CF-4131-AF57-FF1E362A4B26}" dt="2019-07-31T16:45:46.093" v="306"/>
+          <ac:picMkLst>
+            <pc:docMk/>
+            <pc:sldMk cId="1015099582" sldId="274"/>
+            <ac:picMk id="7" creationId="{8DA6CBDE-19A4-4A41-9D43-6E14B3ED012F}"/>
+          </ac:picMkLst>
+        </pc:picChg>
+      </pc:sldChg>
+    </pc:docChg>
+  </pc:docChgLst>
+</pc:chgInfo>
+</file>
+
 <file path=ppt/slideLayouts/slideLayout1.xml><?xml version="1.0" encoding="utf-8"?>
 <p:sldLayout xmlns:a="http://schemas.openxmlformats.org/drawingml/2006/main" xmlns:r="http://schemas.openxmlformats.org/officeDocument/2006/relationships" xmlns:p="http://schemas.openxmlformats.org/presentationml/2006/main" showMasterSp="0" type="title" preserve="1">
   <p:cSld name="Title Slide">
@@ -1329,7 +1468,7 @@
           <a:p>
             <a:fld id="{9DB68FA3-A99A-4C23-948D-78221208575F}" type="datetimeFigureOut">
               <a:rPr lang="en-US" smtClean="0"/>
-              <a:t>7/29/2019</a:t>
+              <a:t>7/31/2019</a:t>
             </a:fld>
             <a:endParaRPr lang="en-US"/>
           </a:p>
@@ -1567,7 +1706,7 @@
           <a:p>
             <a:fld id="{9DB68FA3-A99A-4C23-948D-78221208575F}" type="datetimeFigureOut">
               <a:rPr lang="en-US" smtClean="0"/>
-              <a:t>7/29/2019</a:t>
+              <a:t>7/31/2019</a:t>
             </a:fld>
             <a:endParaRPr lang="en-US"/>
           </a:p>
@@ -1747,7 +1886,7 @@
           <a:p>
             <a:fld id="{9DB68FA3-A99A-4C23-948D-78221208575F}" type="datetimeFigureOut">
               <a:rPr lang="en-US" smtClean="0"/>
-              <a:t>7/29/2019</a:t>
+              <a:t>7/31/2019</a:t>
             </a:fld>
             <a:endParaRPr lang="en-US"/>
           </a:p>
@@ -1917,7 +2056,7 @@
           <a:p>
             <a:fld id="{9DB68FA3-A99A-4C23-948D-78221208575F}" type="datetimeFigureOut">
               <a:rPr lang="en-US" smtClean="0"/>
-              <a:t>7/29/2019</a:t>
+              <a:t>7/31/2019</a:t>
             </a:fld>
             <a:endParaRPr lang="en-US"/>
           </a:p>
@@ -2193,7 +2332,7 @@
           <a:p>
             <a:fld id="{9DB68FA3-A99A-4C23-948D-78221208575F}" type="datetimeFigureOut">
               <a:rPr lang="en-US" smtClean="0"/>
-              <a:t>7/29/2019</a:t>
+              <a:t>7/31/2019</a:t>
             </a:fld>
             <a:endParaRPr lang="en-US"/>
           </a:p>
@@ -3394,7 +3533,7 @@
           <a:p>
             <a:fld id="{9DB68FA3-A99A-4C23-948D-78221208575F}" type="datetimeFigureOut">
               <a:rPr lang="en-US" smtClean="0"/>
-              <a:t>7/29/2019</a:t>
+              <a:t>7/31/2019</a:t>
             </a:fld>
             <a:endParaRPr lang="en-US"/>
           </a:p>
@@ -3784,7 +3923,7 @@
           <a:p>
             <a:fld id="{9DB68FA3-A99A-4C23-948D-78221208575F}" type="datetimeFigureOut">
               <a:rPr lang="en-US" smtClean="0"/>
-              <a:t>7/29/2019</a:t>
+              <a:t>7/31/2019</a:t>
             </a:fld>
             <a:endParaRPr lang="en-US"/>
           </a:p>
@@ -3907,7 +4046,7 @@
           <a:p>
             <a:fld id="{9DB68FA3-A99A-4C23-948D-78221208575F}" type="datetimeFigureOut">
               <a:rPr lang="en-US" smtClean="0"/>
-              <a:t>7/29/2019</a:t>
+              <a:t>7/31/2019</a:t>
             </a:fld>
             <a:endParaRPr lang="en-US"/>
           </a:p>
@@ -4002,7 +4141,7 @@
           <a:p>
             <a:fld id="{9DB68FA3-A99A-4C23-948D-78221208575F}" type="datetimeFigureOut">
               <a:rPr lang="en-US" smtClean="0"/>
-              <a:t>7/29/2019</a:t>
+              <a:t>7/31/2019</a:t>
             </a:fld>
             <a:endParaRPr lang="en-US"/>
           </a:p>
@@ -4765,7 +4904,7 @@
           <a:p>
             <a:fld id="{9DB68FA3-A99A-4C23-948D-78221208575F}" type="datetimeFigureOut">
               <a:rPr lang="en-US" smtClean="0"/>
-              <a:t>7/29/2019</a:t>
+              <a:t>7/31/2019</a:t>
             </a:fld>
             <a:endParaRPr lang="en-US"/>
           </a:p>
@@ -5605,7 +5744,7 @@
           <a:p>
             <a:fld id="{9DB68FA3-A99A-4C23-948D-78221208575F}" type="datetimeFigureOut">
               <a:rPr lang="en-US" smtClean="0"/>
-              <a:t>7/29/2019</a:t>
+              <a:t>7/31/2019</a:t>
             </a:fld>
             <a:endParaRPr lang="en-US"/>
           </a:p>
@@ -5832,7 +5971,7 @@
           <a:p>
             <a:fld id="{9DB68FA3-A99A-4C23-948D-78221208575F}" type="datetimeFigureOut">
               <a:rPr lang="en-US" smtClean="0"/>
-              <a:t>7/29/2019</a:t>
+              <a:t>7/31/2019</a:t>
             </a:fld>
             <a:endParaRPr lang="en-US"/>
           </a:p>
@@ -9390,7 +9529,7 @@
         </p:spPr>
         <p:txBody>
           <a:bodyPr>
-            <a:normAutofit lnSpcReduction="10000"/>
+            <a:normAutofit/>
           </a:bodyPr>
           <a:lstStyle/>
           <a:p>
@@ -9430,7 +9569,7 @@
           <a:p>
             <a:r>
               <a:rPr lang="en-US" sz="2600" dirty="0"/>
-              <a:t>Users can browse by street address or landlord traits</a:t>
+              <a:t>Reviews are made for landlords and properties</a:t>
             </a:r>
             <a:br>
               <a:rPr lang="en-US" dirty="0"/>
@@ -11019,7 +11158,7 @@
         </p:blipFill>
         <p:spPr bwMode="auto">
           <a:xfrm>
-            <a:off x="7917713" y="2736492"/>
+            <a:off x="7788404" y="1802893"/>
             <a:ext cx="2768342" cy="2578241"/>
           </a:xfrm>
           <a:prstGeom prst="rect">
@@ -11035,6 +11174,49 @@
               </a14:hiddenFill>
             </a:ext>
           </a:extLst>
+        </p:spPr>
+      </p:pic>
+      <p:pic>
+        <p:nvPicPr>
+          <p:cNvPr id="5" name="Content Placeholder 7">
+            <a:extLst>
+              <a:ext uri="{FF2B5EF4-FFF2-40B4-BE49-F238E27FC236}">
+                <a16:creationId xmlns:a16="http://schemas.microsoft.com/office/drawing/2014/main" id="{DF47BB68-AFAE-44D1-B6ED-9B6F973F2520}"/>
+              </a:ext>
+            </a:extLst>
+          </p:cNvPr>
+          <p:cNvPicPr>
+            <a:picLocks noChangeAspect="1"/>
+          </p:cNvPicPr>
+          <p:nvPr/>
+        </p:nvPicPr>
+        <p:blipFill>
+          <a:blip r:embed="rId3">
+            <a:extLst>
+              <a:ext uri="{28A0092B-C50C-407E-A947-70E740481C1C}">
+                <a14:useLocalDpi xmlns:a14="http://schemas.microsoft.com/office/drawing/2010/main" val="0"/>
+              </a:ext>
+            </a:extLst>
+          </a:blip>
+          <a:stretch>
+            <a:fillRect/>
+          </a:stretch>
+        </p:blipFill>
+        <p:spPr>
+          <a:xfrm>
+            <a:off x="6629400" y="5113111"/>
+            <a:ext cx="4800600" cy="1249589"/>
+          </a:xfrm>
+          <a:prstGeom prst="rect">
+            <a:avLst/>
+          </a:prstGeom>
+          <a:effectLst>
+            <a:outerShdw blurRad="50800" dist="38100" dir="8100000" algn="tr" rotWithShape="0">
+              <a:prstClr val="black">
+                <a:alpha val="40000"/>
+              </a:prstClr>
+            </a:outerShdw>
+          </a:effectLst>
         </p:spPr>
       </p:pic>
     </p:spTree>
@@ -11198,7 +11380,7 @@
         </p:blipFill>
         <p:spPr bwMode="auto">
           <a:xfrm>
-            <a:off x="7286846" y="2529794"/>
+            <a:off x="7269221" y="1531171"/>
             <a:ext cx="3098948" cy="2724239"/>
           </a:xfrm>
           <a:prstGeom prst="rect">
@@ -11216,6 +11398,49 @@
           </a:extLst>
         </p:spPr>
       </p:pic>
+      <p:pic>
+        <p:nvPicPr>
+          <p:cNvPr id="5" name="Content Placeholder 7">
+            <a:extLst>
+              <a:ext uri="{FF2B5EF4-FFF2-40B4-BE49-F238E27FC236}">
+                <a16:creationId xmlns:a16="http://schemas.microsoft.com/office/drawing/2014/main" id="{53C5CEE3-0633-47B2-834D-526F4970743A}"/>
+              </a:ext>
+            </a:extLst>
+          </p:cNvPr>
+          <p:cNvPicPr>
+            <a:picLocks noChangeAspect="1"/>
+          </p:cNvPicPr>
+          <p:nvPr/>
+        </p:nvPicPr>
+        <p:blipFill>
+          <a:blip r:embed="rId3">
+            <a:extLst>
+              <a:ext uri="{28A0092B-C50C-407E-A947-70E740481C1C}">
+                <a14:useLocalDpi xmlns:a14="http://schemas.microsoft.com/office/drawing/2010/main" val="0"/>
+              </a:ext>
+            </a:extLst>
+          </a:blip>
+          <a:stretch>
+            <a:fillRect/>
+          </a:stretch>
+        </p:blipFill>
+        <p:spPr>
+          <a:xfrm>
+            <a:off x="6629400" y="5113111"/>
+            <a:ext cx="4800600" cy="1249589"/>
+          </a:xfrm>
+          <a:prstGeom prst="rect">
+            <a:avLst/>
+          </a:prstGeom>
+          <a:effectLst>
+            <a:outerShdw blurRad="50800" dist="38100" dir="8100000" algn="tr" rotWithShape="0">
+              <a:prstClr val="black">
+                <a:alpha val="40000"/>
+              </a:prstClr>
+            </a:outerShdw>
+          </a:effectLst>
+        </p:spPr>
+      </p:pic>
     </p:spTree>
     <p:extLst>
       <p:ext uri="{BB962C8B-B14F-4D97-AF65-F5344CB8AC3E}">
@@ -11230,6 +11455,293 @@
 </file>
 
 <file path=ppt/slides/slide7.xml><?xml version="1.0" encoding="utf-8"?>
+<p:sld xmlns:a="http://schemas.openxmlformats.org/drawingml/2006/main" xmlns:r="http://schemas.openxmlformats.org/officeDocument/2006/relationships" xmlns:p="http://schemas.openxmlformats.org/presentationml/2006/main">
+  <p:cSld>
+    <p:spTree>
+      <p:nvGrpSpPr>
+        <p:cNvPr id="1" name=""/>
+        <p:cNvGrpSpPr/>
+        <p:nvPr/>
+      </p:nvGrpSpPr>
+      <p:grpSpPr>
+        <a:xfrm>
+          <a:off x="0" y="0"/>
+          <a:ext cx="0" cy="0"/>
+          <a:chOff x="0" y="0"/>
+          <a:chExt cx="0" cy="0"/>
+        </a:xfrm>
+      </p:grpSpPr>
+      <p:sp>
+        <p:nvSpPr>
+          <p:cNvPr id="2" name="Title 1">
+            <a:extLst>
+              <a:ext uri="{FF2B5EF4-FFF2-40B4-BE49-F238E27FC236}">
+                <a16:creationId xmlns:a16="http://schemas.microsoft.com/office/drawing/2014/main" id="{73796899-DAB3-494A-98EE-6D8675752523}"/>
+              </a:ext>
+            </a:extLst>
+          </p:cNvPr>
+          <p:cNvSpPr>
+            <a:spLocks noGrp="1"/>
+          </p:cNvSpPr>
+          <p:nvPr>
+            <p:ph type="title"/>
+          </p:nvPr>
+        </p:nvSpPr>
+        <p:spPr/>
+        <p:txBody>
+          <a:bodyPr/>
+          <a:lstStyle/>
+          <a:p>
+            <a:r>
+              <a:rPr lang="en-US" dirty="0"/>
+              <a:t>Project reflection</a:t>
+            </a:r>
+          </a:p>
+        </p:txBody>
+      </p:sp>
+      <p:sp>
+        <p:nvSpPr>
+          <p:cNvPr id="3" name="Content Placeholder 2">
+            <a:extLst>
+              <a:ext uri="{FF2B5EF4-FFF2-40B4-BE49-F238E27FC236}">
+                <a16:creationId xmlns:a16="http://schemas.microsoft.com/office/drawing/2014/main" id="{1F5FCD82-D14D-4E3B-95CB-BAC77912A17A}"/>
+              </a:ext>
+            </a:extLst>
+          </p:cNvPr>
+          <p:cNvSpPr>
+            <a:spLocks noGrp="1"/>
+          </p:cNvSpPr>
+          <p:nvPr>
+            <p:ph idx="1"/>
+          </p:nvPr>
+        </p:nvSpPr>
+        <p:spPr>
+          <a:xfrm>
+            <a:off x="2375803" y="2667752"/>
+            <a:ext cx="2842149" cy="1216404"/>
+          </a:xfrm>
+        </p:spPr>
+        <p:txBody>
+          <a:bodyPr>
+            <a:normAutofit fontScale="92500" lnSpcReduction="10000"/>
+          </a:bodyPr>
+          <a:lstStyle/>
+          <a:p>
+            <a:r>
+              <a:rPr lang="en-US" sz="2400" dirty="0"/>
+              <a:t>Integration challenges</a:t>
+            </a:r>
+          </a:p>
+          <a:p>
+            <a:r>
+              <a:rPr lang="en-US" sz="2400" dirty="0"/>
+              <a:t>Trello organization</a:t>
+            </a:r>
+          </a:p>
+        </p:txBody>
+      </p:sp>
+      <p:sp>
+        <p:nvSpPr>
+          <p:cNvPr id="4" name="TextBox 3">
+            <a:extLst>
+              <a:ext uri="{FF2B5EF4-FFF2-40B4-BE49-F238E27FC236}">
+                <a16:creationId xmlns:a16="http://schemas.microsoft.com/office/drawing/2014/main" id="{A304C36F-F012-40B4-9077-E7C13CF63058}"/>
+              </a:ext>
+            </a:extLst>
+          </p:cNvPr>
+          <p:cNvSpPr txBox="1"/>
+          <p:nvPr/>
+        </p:nvSpPr>
+        <p:spPr>
+          <a:xfrm>
+            <a:off x="6627303" y="2667752"/>
+            <a:ext cx="3974742" cy="1200329"/>
+          </a:xfrm>
+          <a:prstGeom prst="rect">
+            <a:avLst/>
+          </a:prstGeom>
+          <a:noFill/>
+        </p:spPr>
+        <p:txBody>
+          <a:bodyPr wrap="none" rtlCol="0">
+            <a:spAutoFit/>
+          </a:bodyPr>
+          <a:lstStyle/>
+          <a:p>
+            <a:pPr marL="285750" indent="-285750">
+              <a:buFont typeface="Arial" panose="020B0604020202020204" pitchFamily="34" charset="0"/>
+              <a:buChar char="•"/>
+            </a:pPr>
+            <a:r>
+              <a:rPr lang="en-US" sz="2400" dirty="0"/>
+              <a:t>Familiar technology stack</a:t>
+            </a:r>
+          </a:p>
+          <a:p>
+            <a:pPr marL="285750" indent="-285750">
+              <a:buFont typeface="Arial" panose="020B0604020202020204" pitchFamily="34" charset="0"/>
+              <a:buChar char="•"/>
+            </a:pPr>
+            <a:r>
+              <a:rPr lang="en-US" sz="2400" dirty="0"/>
+              <a:t>Work at our own pace</a:t>
+            </a:r>
+          </a:p>
+          <a:p>
+            <a:pPr marL="285750" indent="-285750">
+              <a:buFont typeface="Arial" panose="020B0604020202020204" pitchFamily="34" charset="0"/>
+              <a:buChar char="•"/>
+            </a:pPr>
+            <a:r>
+              <a:rPr lang="en-US" sz="2400" dirty="0"/>
+              <a:t>Full product design freedom</a:t>
+            </a:r>
+          </a:p>
+        </p:txBody>
+      </p:sp>
+      <p:sp>
+        <p:nvSpPr>
+          <p:cNvPr id="5" name="TextBox 4">
+            <a:extLst>
+              <a:ext uri="{FF2B5EF4-FFF2-40B4-BE49-F238E27FC236}">
+                <a16:creationId xmlns:a16="http://schemas.microsoft.com/office/drawing/2014/main" id="{6E45F526-CECD-42FD-B5E1-969D6F973932}"/>
+              </a:ext>
+            </a:extLst>
+          </p:cNvPr>
+          <p:cNvSpPr txBox="1"/>
+          <p:nvPr/>
+        </p:nvSpPr>
+        <p:spPr>
+          <a:xfrm>
+            <a:off x="3423349" y="2040302"/>
+            <a:ext cx="845103" cy="461665"/>
+          </a:xfrm>
+          <a:prstGeom prst="rect">
+            <a:avLst/>
+          </a:prstGeom>
+          <a:noFill/>
+        </p:spPr>
+        <p:txBody>
+          <a:bodyPr wrap="none" rtlCol="0">
+            <a:spAutoFit/>
+          </a:bodyPr>
+          <a:lstStyle/>
+          <a:p>
+            <a:r>
+              <a:rPr lang="en-US" sz="2400">
+                <a:solidFill>
+                  <a:schemeClr val="tx1">
+                    <a:lumMod val="65000"/>
+                    <a:lumOff val="35000"/>
+                  </a:schemeClr>
+                </a:solidFill>
+              </a:rPr>
+              <a:t>Cons</a:t>
+            </a:r>
+            <a:endParaRPr lang="en-US" dirty="0">
+              <a:solidFill>
+                <a:schemeClr val="tx1">
+                  <a:lumMod val="65000"/>
+                  <a:lumOff val="35000"/>
+                </a:schemeClr>
+              </a:solidFill>
+            </a:endParaRPr>
+          </a:p>
+        </p:txBody>
+      </p:sp>
+      <p:sp>
+        <p:nvSpPr>
+          <p:cNvPr id="6" name="TextBox 5">
+            <a:extLst>
+              <a:ext uri="{FF2B5EF4-FFF2-40B4-BE49-F238E27FC236}">
+                <a16:creationId xmlns:a16="http://schemas.microsoft.com/office/drawing/2014/main" id="{63CEAFBF-DB44-43DD-A599-6546C19B5A4B}"/>
+              </a:ext>
+            </a:extLst>
+          </p:cNvPr>
+          <p:cNvSpPr txBox="1"/>
+          <p:nvPr/>
+        </p:nvSpPr>
+        <p:spPr>
+          <a:xfrm flipH="1">
+            <a:off x="7898835" y="2056809"/>
+            <a:ext cx="847288" cy="461665"/>
+          </a:xfrm>
+          <a:prstGeom prst="rect">
+            <a:avLst/>
+          </a:prstGeom>
+          <a:noFill/>
+        </p:spPr>
+        <p:txBody>
+          <a:bodyPr wrap="square" rtlCol="0">
+            <a:spAutoFit/>
+          </a:bodyPr>
+          <a:lstStyle/>
+          <a:p>
+            <a:r>
+              <a:rPr lang="en-US" sz="2400" dirty="0"/>
+              <a:t>Pros</a:t>
+            </a:r>
+            <a:endParaRPr lang="en-US" dirty="0"/>
+          </a:p>
+        </p:txBody>
+      </p:sp>
+      <p:pic>
+        <p:nvPicPr>
+          <p:cNvPr id="7" name="Content Placeholder 7">
+            <a:extLst>
+              <a:ext uri="{FF2B5EF4-FFF2-40B4-BE49-F238E27FC236}">
+                <a16:creationId xmlns:a16="http://schemas.microsoft.com/office/drawing/2014/main" id="{8DA6CBDE-19A4-4A41-9D43-6E14B3ED012F}"/>
+              </a:ext>
+            </a:extLst>
+          </p:cNvPr>
+          <p:cNvPicPr>
+            <a:picLocks noChangeAspect="1"/>
+          </p:cNvPicPr>
+          <p:nvPr/>
+        </p:nvPicPr>
+        <p:blipFill>
+          <a:blip r:embed="rId2">
+            <a:extLst>
+              <a:ext uri="{28A0092B-C50C-407E-A947-70E740481C1C}">
+                <a14:useLocalDpi xmlns:a14="http://schemas.microsoft.com/office/drawing/2010/main" val="0"/>
+              </a:ext>
+            </a:extLst>
+          </a:blip>
+          <a:stretch>
+            <a:fillRect/>
+          </a:stretch>
+        </p:blipFill>
+        <p:spPr>
+          <a:xfrm>
+            <a:off x="6629400" y="5113111"/>
+            <a:ext cx="4800600" cy="1249589"/>
+          </a:xfrm>
+          <a:prstGeom prst="rect">
+            <a:avLst/>
+          </a:prstGeom>
+          <a:effectLst>
+            <a:outerShdw blurRad="50800" dist="38100" dir="8100000" algn="tr" rotWithShape="0">
+              <a:prstClr val="black">
+                <a:alpha val="40000"/>
+              </a:prstClr>
+            </a:outerShdw>
+          </a:effectLst>
+        </p:spPr>
+      </p:pic>
+    </p:spTree>
+    <p:extLst>
+      <p:ext uri="{BB962C8B-B14F-4D97-AF65-F5344CB8AC3E}">
+        <p14:creationId xmlns:p14="http://schemas.microsoft.com/office/powerpoint/2010/main" val="1015099582"/>
+      </p:ext>
+    </p:extLst>
+  </p:cSld>
+  <p:clrMapOvr>
+    <a:masterClrMapping/>
+  </p:clrMapOvr>
+</p:sld>
+</file>
+
+<file path=ppt/slides/slide8.xml><?xml version="1.0" encoding="utf-8"?>
 <p:sld xmlns:a="http://schemas.openxmlformats.org/drawingml/2006/main" xmlns:r="http://schemas.openxmlformats.org/officeDocument/2006/relationships" xmlns:p="http://schemas.openxmlformats.org/presentationml/2006/main">
   <p:cSld>
     <p:spTree>

</xml_diff>

<commit_message>
minor updates and cleanup
</commit_message>
<xml_diff>
--- a/RateMySlumlord-FinalDemo.pptx
+++ b/RateMySlumlord-FinalDemo.pptx
@@ -10093,7 +10093,7 @@
           <a:p>
             <a:r>
               <a:rPr lang="en-US" dirty="0"/>
-              <a:t>Unit testing with JUnit </a:t>
+              <a:t>Unit testing with JUnit/Selenium</a:t>
             </a:r>
           </a:p>
         </p:txBody>
@@ -10169,7 +10169,7 @@
         </p:blipFill>
         <p:spPr bwMode="auto">
           <a:xfrm>
-            <a:off x="8238395" y="3309759"/>
+            <a:off x="8238395" y="3387676"/>
             <a:ext cx="2554029" cy="1094584"/>
           </a:xfrm>
           <a:prstGeom prst="rect">
@@ -10310,7 +10310,7 @@
         </p:blipFill>
         <p:spPr bwMode="auto">
           <a:xfrm>
-            <a:off x="6861371" y="2151670"/>
+            <a:off x="6638893" y="2380315"/>
             <a:ext cx="1297234" cy="1442484"/>
           </a:xfrm>
           <a:prstGeom prst="rect">
@@ -10741,7 +10741,7 @@
             </a:r>
             <a:r>
               <a:rPr lang="en-US" dirty="0"/>
-              <a:t> Resource for Landlord/Tenant Law</a:t>
+              <a:t> Resources for Landlord/Tenant Law</a:t>
             </a:r>
           </a:p>
         </p:txBody>
@@ -11517,24 +11517,32 @@
         </p:nvSpPr>
         <p:spPr>
           <a:xfrm>
-            <a:off x="2375803" y="2667752"/>
-            <a:ext cx="2842149" cy="1216404"/>
+            <a:off x="7044101" y="3055381"/>
+            <a:ext cx="3126094" cy="1216404"/>
           </a:xfrm>
         </p:spPr>
         <p:txBody>
           <a:bodyPr>
-            <a:normAutofit fontScale="92500" lnSpcReduction="10000"/>
+            <a:noAutofit/>
           </a:bodyPr>
           <a:lstStyle/>
           <a:p>
             <a:r>
-              <a:rPr lang="en-US" sz="2400" dirty="0"/>
+              <a:rPr lang="en-US" sz="2400" dirty="0">
+                <a:solidFill>
+                  <a:schemeClr val="tx1"/>
+                </a:solidFill>
+              </a:rPr>
               <a:t>Integration challenges</a:t>
             </a:r>
           </a:p>
           <a:p>
             <a:r>
-              <a:rPr lang="en-US" sz="2400" dirty="0"/>
+              <a:rPr lang="en-US" sz="2400" dirty="0">
+                <a:solidFill>
+                  <a:schemeClr val="tx1"/>
+                </a:solidFill>
+              </a:rPr>
               <a:t>Trello organization</a:t>
             </a:r>
           </a:p>
@@ -11554,7 +11562,7 @@
         </p:nvSpPr>
         <p:spPr>
           <a:xfrm>
-            <a:off x="6627303" y="2667752"/>
+            <a:off x="1485368" y="3055381"/>
             <a:ext cx="3974742" cy="1200329"/>
           </a:xfrm>
           <a:prstGeom prst="rect">
@@ -11613,7 +11621,7 @@
         </p:nvSpPr>
         <p:spPr>
           <a:xfrm>
-            <a:off x="3423349" y="2040302"/>
+            <a:off x="8184597" y="2593716"/>
             <a:ext cx="845103" cy="461665"/>
           </a:xfrm>
           <a:prstGeom prst="rect">
@@ -11628,7 +11636,7 @@
           <a:lstStyle/>
           <a:p>
             <a:r>
-              <a:rPr lang="en-US" sz="2400">
+              <a:rPr lang="en-US" sz="2400" u="sng" dirty="0">
                 <a:solidFill>
                   <a:schemeClr val="tx1">
                     <a:lumMod val="65000"/>
@@ -11638,7 +11646,7 @@
               </a:rPr>
               <a:t>Cons</a:t>
             </a:r>
-            <a:endParaRPr lang="en-US" dirty="0">
+            <a:endParaRPr lang="en-US" u="sng" dirty="0">
               <a:solidFill>
                 <a:schemeClr val="tx1">
                   <a:lumMod val="65000"/>
@@ -11663,7 +11671,7 @@
         </p:nvSpPr>
         <p:spPr>
           <a:xfrm flipH="1">
-            <a:off x="7898835" y="2056809"/>
+            <a:off x="3049095" y="2593716"/>
             <a:ext cx="847288" cy="461665"/>
           </a:xfrm>
           <a:prstGeom prst="rect">
@@ -11678,10 +11686,10 @@
           <a:lstStyle/>
           <a:p>
             <a:r>
-              <a:rPr lang="en-US" sz="2400" dirty="0"/>
+              <a:rPr lang="en-US" sz="2400" u="sng" dirty="0"/>
               <a:t>Pros</a:t>
             </a:r>
-            <a:endParaRPr lang="en-US" dirty="0"/>
+            <a:endParaRPr lang="en-US" u="sng" dirty="0"/>
           </a:p>
         </p:txBody>
       </p:sp>

</xml_diff>

<commit_message>
"I just want to be sure"
</commit_message>
<xml_diff>
--- a/RateMySlumlord-FinalDemo.pptx
+++ b/RateMySlumlord-FinalDemo.pptx
@@ -9,11 +9,8 @@
     <p:sldId id="258" r:id="rId3"/>
     <p:sldId id="266" r:id="rId4"/>
     <p:sldId id="271" r:id="rId5"/>
-    <p:sldId id="275" r:id="rId6"/>
-    <p:sldId id="269" r:id="rId7"/>
-    <p:sldId id="273" r:id="rId8"/>
-    <p:sldId id="274" r:id="rId9"/>
-    <p:sldId id="272" r:id="rId10"/>
+    <p:sldId id="269" r:id="rId6"/>
+    <p:sldId id="272" r:id="rId7"/>
   </p:sldIdLst>
   <p:sldSz cx="12192000" cy="6858000"/>
   <p:notesSz cx="6858000" cy="9144000"/>
@@ -120,144 +117,6 @@
 </p:presentation>
 </file>
 
-<file path=ppt/revisionInfo.xml><?xml version="1.0" encoding="utf-8"?>
-<p1510:revInfo xmlns:a="http://schemas.openxmlformats.org/drawingml/2006/main" xmlns:r="http://schemas.openxmlformats.org/officeDocument/2006/relationships" xmlns:p1510="http://schemas.microsoft.com/office/powerpoint/2015/10/main">
-  <p1510:revLst>
-    <p1510:client id="{29A24B01-D7CF-4131-AF57-FF1E362A4B26}" v="107" dt="2019-07-31T16:46:04.471"/>
-  </p1510:revLst>
-</p1510:revInfo>
-</file>
-
-<file path=ppt/changesInfos/changesInfo1.xml><?xml version="1.0" encoding="utf-8"?>
-<pc:chgInfo xmlns:a="http://schemas.openxmlformats.org/drawingml/2006/main" xmlns:r="http://schemas.openxmlformats.org/officeDocument/2006/relationships" xmlns:ac="http://schemas.microsoft.com/office/drawing/2013/main/command" xmlns:pc="http://schemas.microsoft.com/office/powerpoint/2013/main/command">
-  <pc:docChgLst>
-    <pc:chgData name="Matt Gabrin" userId="686dd4d528919795" providerId="LiveId" clId="{29A24B01-D7CF-4131-AF57-FF1E362A4B26}"/>
-    <pc:docChg chg="undo custSel addSld modSld">
-      <pc:chgData name="Matt Gabrin" userId="686dd4d528919795" providerId="LiveId" clId="{29A24B01-D7CF-4131-AF57-FF1E362A4B26}" dt="2019-07-31T16:46:20.197" v="316" actId="20577"/>
-      <pc:docMkLst>
-        <pc:docMk/>
-      </pc:docMkLst>
-      <pc:sldChg chg="modSp modAnim">
-        <pc:chgData name="Matt Gabrin" userId="686dd4d528919795" providerId="LiveId" clId="{29A24B01-D7CF-4131-AF57-FF1E362A4B26}" dt="2019-07-31T16:36:02.381" v="89" actId="20577"/>
-        <pc:sldMkLst>
-          <pc:docMk/>
-          <pc:sldMk cId="2770911967" sldId="258"/>
-        </pc:sldMkLst>
-        <pc:spChg chg="mod">
-          <ac:chgData name="Matt Gabrin" userId="686dd4d528919795" providerId="LiveId" clId="{29A24B01-D7CF-4131-AF57-FF1E362A4B26}" dt="2019-07-31T16:36:02.381" v="89" actId="20577"/>
-          <ac:spMkLst>
-            <pc:docMk/>
-            <pc:sldMk cId="2770911967" sldId="258"/>
-            <ac:spMk id="3" creationId="{98E86E6B-94B1-495B-90AD-818255EE2D37}"/>
-          </ac:spMkLst>
-        </pc:spChg>
-      </pc:sldChg>
-      <pc:sldChg chg="addSp modSp">
-        <pc:chgData name="Matt Gabrin" userId="686dd4d528919795" providerId="LiveId" clId="{29A24B01-D7CF-4131-AF57-FF1E362A4B26}" dt="2019-07-31T16:46:04.471" v="312" actId="1076"/>
-        <pc:sldMkLst>
-          <pc:docMk/>
-          <pc:sldMk cId="46943841" sldId="269"/>
-        </pc:sldMkLst>
-        <pc:picChg chg="add">
-          <ac:chgData name="Matt Gabrin" userId="686dd4d528919795" providerId="LiveId" clId="{29A24B01-D7CF-4131-AF57-FF1E362A4B26}" dt="2019-07-31T16:46:02.031" v="311"/>
-          <ac:picMkLst>
-            <pc:docMk/>
-            <pc:sldMk cId="46943841" sldId="269"/>
-            <ac:picMk id="5" creationId="{DF47BB68-AFAE-44D1-B6ED-9B6F973F2520}"/>
-          </ac:picMkLst>
-        </pc:picChg>
-        <pc:picChg chg="mod">
-          <ac:chgData name="Matt Gabrin" userId="686dd4d528919795" providerId="LiveId" clId="{29A24B01-D7CF-4131-AF57-FF1E362A4B26}" dt="2019-07-31T16:46:04.471" v="312" actId="1076"/>
-          <ac:picMkLst>
-            <pc:docMk/>
-            <pc:sldMk cId="46943841" sldId="269"/>
-            <ac:picMk id="2050" creationId="{282374A3-63CD-4D72-ABD2-4B9F1A944E5D}"/>
-          </ac:picMkLst>
-        </pc:picChg>
-      </pc:sldChg>
-      <pc:sldChg chg="addSp modSp">
-        <pc:chgData name="Matt Gabrin" userId="686dd4d528919795" providerId="LiveId" clId="{29A24B01-D7CF-4131-AF57-FF1E362A4B26}" dt="2019-07-31T16:45:58.278" v="309" actId="1076"/>
-        <pc:sldMkLst>
-          <pc:docMk/>
-          <pc:sldMk cId="1946155254" sldId="273"/>
-        </pc:sldMkLst>
-        <pc:picChg chg="add">
-          <ac:chgData name="Matt Gabrin" userId="686dd4d528919795" providerId="LiveId" clId="{29A24B01-D7CF-4131-AF57-FF1E362A4B26}" dt="2019-07-31T16:45:54.275" v="307"/>
-          <ac:picMkLst>
-            <pc:docMk/>
-            <pc:sldMk cId="1946155254" sldId="273"/>
-            <ac:picMk id="5" creationId="{53C5CEE3-0633-47B2-834D-526F4970743A}"/>
-          </ac:picMkLst>
-        </pc:picChg>
-        <pc:picChg chg="mod">
-          <ac:chgData name="Matt Gabrin" userId="686dd4d528919795" providerId="LiveId" clId="{29A24B01-D7CF-4131-AF57-FF1E362A4B26}" dt="2019-07-31T16:45:58.278" v="309" actId="1076"/>
-          <ac:picMkLst>
-            <pc:docMk/>
-            <pc:sldMk cId="1946155254" sldId="273"/>
-            <ac:picMk id="1026" creationId="{98C41F0C-9500-498F-AD70-91E0078F0C09}"/>
-          </ac:picMkLst>
-        </pc:picChg>
-      </pc:sldChg>
-      <pc:sldChg chg="addSp modSp add">
-        <pc:chgData name="Matt Gabrin" userId="686dd4d528919795" providerId="LiveId" clId="{29A24B01-D7CF-4131-AF57-FF1E362A4B26}" dt="2019-07-31T16:46:20.197" v="316" actId="20577"/>
-        <pc:sldMkLst>
-          <pc:docMk/>
-          <pc:sldMk cId="1015099582" sldId="274"/>
-        </pc:sldMkLst>
-        <pc:spChg chg="mod">
-          <ac:chgData name="Matt Gabrin" userId="686dd4d528919795" providerId="LiveId" clId="{29A24B01-D7CF-4131-AF57-FF1E362A4B26}" dt="2019-07-31T16:38:10.209" v="108" actId="20577"/>
-          <ac:spMkLst>
-            <pc:docMk/>
-            <pc:sldMk cId="1015099582" sldId="274"/>
-            <ac:spMk id="2" creationId="{73796899-DAB3-494A-98EE-6D8675752523}"/>
-          </ac:spMkLst>
-        </pc:spChg>
-        <pc:spChg chg="mod">
-          <ac:chgData name="Matt Gabrin" userId="686dd4d528919795" providerId="LiveId" clId="{29A24B01-D7CF-4131-AF57-FF1E362A4B26}" dt="2019-07-31T16:45:25.961" v="304" actId="403"/>
-          <ac:spMkLst>
-            <pc:docMk/>
-            <pc:sldMk cId="1015099582" sldId="274"/>
-            <ac:spMk id="3" creationId="{1F5FCD82-D14D-4E3B-95CB-BAC77912A17A}"/>
-          </ac:spMkLst>
-        </pc:spChg>
-        <pc:spChg chg="add mod">
-          <ac:chgData name="Matt Gabrin" userId="686dd4d528919795" providerId="LiveId" clId="{29A24B01-D7CF-4131-AF57-FF1E362A4B26}" dt="2019-07-31T16:45:33.520" v="305" actId="403"/>
-          <ac:spMkLst>
-            <pc:docMk/>
-            <pc:sldMk cId="1015099582" sldId="274"/>
-            <ac:spMk id="4" creationId="{A304C36F-F012-40B4-9077-E7C13CF63058}"/>
-          </ac:spMkLst>
-        </pc:spChg>
-        <pc:spChg chg="add mod">
-          <ac:chgData name="Matt Gabrin" userId="686dd4d528919795" providerId="LiveId" clId="{29A24B01-D7CF-4131-AF57-FF1E362A4B26}" dt="2019-07-31T16:46:20.197" v="316" actId="20577"/>
-          <ac:spMkLst>
-            <pc:docMk/>
-            <pc:sldMk cId="1015099582" sldId="274"/>
-            <ac:spMk id="5" creationId="{6E45F526-CECD-42FD-B5E1-969D6F973932}"/>
-          </ac:spMkLst>
-        </pc:spChg>
-        <pc:spChg chg="add mod">
-          <ac:chgData name="Matt Gabrin" userId="686dd4d528919795" providerId="LiveId" clId="{29A24B01-D7CF-4131-AF57-FF1E362A4B26}" dt="2019-07-31T16:44:06.913" v="297" actId="1076"/>
-          <ac:spMkLst>
-            <pc:docMk/>
-            <pc:sldMk cId="1015099582" sldId="274"/>
-            <ac:spMk id="6" creationId="{63CEAFBF-DB44-43DD-A599-6546C19B5A4B}"/>
-          </ac:spMkLst>
-        </pc:spChg>
-        <pc:picChg chg="add">
-          <ac:chgData name="Matt Gabrin" userId="686dd4d528919795" providerId="LiveId" clId="{29A24B01-D7CF-4131-AF57-FF1E362A4B26}" dt="2019-07-31T16:45:46.093" v="306"/>
-          <ac:picMkLst>
-            <pc:docMk/>
-            <pc:sldMk cId="1015099582" sldId="274"/>
-            <ac:picMk id="7" creationId="{8DA6CBDE-19A4-4A41-9D43-6E14B3ED012F}"/>
-          </ac:picMkLst>
-        </pc:picChg>
-      </pc:sldChg>
-    </pc:docChg>
-  </pc:docChgLst>
-</pc:chgInfo>
-</file>
-
 <file path=ppt/slideLayouts/slideLayout1.xml><?xml version="1.0" encoding="utf-8"?>
 <p:sldLayout xmlns:a="http://schemas.openxmlformats.org/drawingml/2006/main" xmlns:r="http://schemas.openxmlformats.org/officeDocument/2006/relationships" xmlns:p="http://schemas.openxmlformats.org/presentationml/2006/main" showMasterSp="0" type="title" preserve="1">
   <p:cSld name="Title Slide">
@@ -1469,7 +1328,7 @@
           <a:p>
             <a:fld id="{9DB68FA3-A99A-4C23-948D-78221208575F}" type="datetimeFigureOut">
               <a:rPr lang="en-US" smtClean="0"/>
-              <a:t>7/31/2019</a:t>
+              <a:t>7/26/2019</a:t>
             </a:fld>
             <a:endParaRPr lang="en-US"/>
           </a:p>
@@ -1707,7 +1566,7 @@
           <a:p>
             <a:fld id="{9DB68FA3-A99A-4C23-948D-78221208575F}" type="datetimeFigureOut">
               <a:rPr lang="en-US" smtClean="0"/>
-              <a:t>7/31/2019</a:t>
+              <a:t>7/26/2019</a:t>
             </a:fld>
             <a:endParaRPr lang="en-US"/>
           </a:p>
@@ -1887,7 +1746,7 @@
           <a:p>
             <a:fld id="{9DB68FA3-A99A-4C23-948D-78221208575F}" type="datetimeFigureOut">
               <a:rPr lang="en-US" smtClean="0"/>
-              <a:t>7/31/2019</a:t>
+              <a:t>7/26/2019</a:t>
             </a:fld>
             <a:endParaRPr lang="en-US"/>
           </a:p>
@@ -2057,7 +1916,7 @@
           <a:p>
             <a:fld id="{9DB68FA3-A99A-4C23-948D-78221208575F}" type="datetimeFigureOut">
               <a:rPr lang="en-US" smtClean="0"/>
-              <a:t>7/31/2019</a:t>
+              <a:t>7/26/2019</a:t>
             </a:fld>
             <a:endParaRPr lang="en-US"/>
           </a:p>
@@ -2333,7 +2192,7 @@
           <a:p>
             <a:fld id="{9DB68FA3-A99A-4C23-948D-78221208575F}" type="datetimeFigureOut">
               <a:rPr lang="en-US" smtClean="0"/>
-              <a:t>7/31/2019</a:t>
+              <a:t>7/26/2019</a:t>
             </a:fld>
             <a:endParaRPr lang="en-US"/>
           </a:p>
@@ -3534,7 +3393,7 @@
           <a:p>
             <a:fld id="{9DB68FA3-A99A-4C23-948D-78221208575F}" type="datetimeFigureOut">
               <a:rPr lang="en-US" smtClean="0"/>
-              <a:t>7/31/2019</a:t>
+              <a:t>7/26/2019</a:t>
             </a:fld>
             <a:endParaRPr lang="en-US"/>
           </a:p>
@@ -3924,7 +3783,7 @@
           <a:p>
             <a:fld id="{9DB68FA3-A99A-4C23-948D-78221208575F}" type="datetimeFigureOut">
               <a:rPr lang="en-US" smtClean="0"/>
-              <a:t>7/31/2019</a:t>
+              <a:t>7/26/2019</a:t>
             </a:fld>
             <a:endParaRPr lang="en-US"/>
           </a:p>
@@ -4047,7 +3906,7 @@
           <a:p>
             <a:fld id="{9DB68FA3-A99A-4C23-948D-78221208575F}" type="datetimeFigureOut">
               <a:rPr lang="en-US" smtClean="0"/>
-              <a:t>7/31/2019</a:t>
+              <a:t>7/26/2019</a:t>
             </a:fld>
             <a:endParaRPr lang="en-US"/>
           </a:p>
@@ -4142,7 +4001,7 @@
           <a:p>
             <a:fld id="{9DB68FA3-A99A-4C23-948D-78221208575F}" type="datetimeFigureOut">
               <a:rPr lang="en-US" smtClean="0"/>
-              <a:t>7/31/2019</a:t>
+              <a:t>7/26/2019</a:t>
             </a:fld>
             <a:endParaRPr lang="en-US"/>
           </a:p>
@@ -4905,7 +4764,7 @@
           <a:p>
             <a:fld id="{9DB68FA3-A99A-4C23-948D-78221208575F}" type="datetimeFigureOut">
               <a:rPr lang="en-US" smtClean="0"/>
-              <a:t>7/31/2019</a:t>
+              <a:t>7/26/2019</a:t>
             </a:fld>
             <a:endParaRPr lang="en-US"/>
           </a:p>
@@ -5745,7 +5604,7 @@
           <a:p>
             <a:fld id="{9DB68FA3-A99A-4C23-948D-78221208575F}" type="datetimeFigureOut">
               <a:rPr lang="en-US" smtClean="0"/>
-              <a:t>7/31/2019</a:t>
+              <a:t>7/26/2019</a:t>
             </a:fld>
             <a:endParaRPr lang="en-US"/>
           </a:p>
@@ -5972,7 +5831,7 @@
           <a:p>
             <a:fld id="{9DB68FA3-A99A-4C23-948D-78221208575F}" type="datetimeFigureOut">
               <a:rPr lang="en-US" smtClean="0"/>
-              <a:t>7/31/2019</a:t>
+              <a:t>7/26/2019</a:t>
             </a:fld>
             <a:endParaRPr lang="en-US"/>
           </a:p>
@@ -9545,7 +9404,7 @@
           <a:p>
             <a:r>
               <a:rPr lang="en-US" sz="2600" dirty="0"/>
-              <a:t>Online Anonymous Landlord Rating Service for Tenants</a:t>
+              <a:t>Online Anonymous Rating Service for Students</a:t>
             </a:r>
           </a:p>
           <a:p>
@@ -9564,13 +9423,13 @@
             <a:pPr lvl="1"/>
             <a:r>
               <a:rPr lang="en-US" sz="2600" dirty="0"/>
-              <a:t>Would rent again?</a:t>
+              <a:t>Security Deposit Returns &amp; Stinginess</a:t>
             </a:r>
           </a:p>
           <a:p>
             <a:r>
               <a:rPr lang="en-US" sz="2600" dirty="0"/>
-              <a:t>Reviews are made for landlords and properties</a:t>
+              <a:t>Users can browse by street address or landlord traits</a:t>
             </a:r>
             <a:br>
               <a:rPr lang="en-US" dirty="0"/>
@@ -10062,34 +9921,39 @@
             </a:r>
           </a:p>
           <a:p>
+            <a:pPr marL="0" indent="0">
+              <a:buNone/>
+            </a:pPr>
+            <a:endParaRPr lang="en-US" dirty="0"/>
+          </a:p>
+          <a:p>
             <a:r>
               <a:rPr lang="en-US" dirty="0"/>
               <a:t>Spring Java framework back-end REST API</a:t>
             </a:r>
           </a:p>
           <a:p>
+            <a:pPr marL="0" indent="0">
+              <a:buNone/>
+            </a:pPr>
+            <a:endParaRPr lang="en-US" dirty="0"/>
+          </a:p>
+          <a:p>
             <a:r>
               <a:rPr lang="en-US" dirty="0"/>
               <a:t>PostgreSQL for database management</a:t>
             </a:r>
           </a:p>
           <a:p>
+            <a:pPr marL="0" indent="0">
+              <a:buNone/>
+            </a:pPr>
+            <a:endParaRPr lang="en-US" dirty="0"/>
+          </a:p>
+          <a:p>
             <a:r>
               <a:rPr lang="en-US" dirty="0"/>
-              <a:t>Unit testing with JUnit/Selenium</a:t>
-            </a:r>
-            <a:br>
-              <a:rPr lang="en-US" dirty="0"/>
-            </a:br>
-            <a:br>
-              <a:rPr lang="en-US" dirty="0"/>
-            </a:br>
-            <a:endParaRPr lang="en-US" dirty="0"/>
-          </a:p>
-          <a:p>
-            <a:r>
-              <a:rPr lang="en-US" dirty="0"/>
-              <a:t>Architecture: MVC</a:t>
+              <a:t>Unit testing with JUnit </a:t>
             </a:r>
           </a:p>
         </p:txBody>
@@ -10134,194 +9998,6 @@
               </a:prstClr>
             </a:outerShdw>
           </a:effectLst>
-        </p:spPr>
-      </p:pic>
-      <p:pic>
-        <p:nvPicPr>
-          <p:cNvPr id="3076" name="Picture 4" descr="Image result for spring boot">
-            <a:extLst>
-              <a:ext uri="{FF2B5EF4-FFF2-40B4-BE49-F238E27FC236}">
-                <a16:creationId xmlns:a16="http://schemas.microsoft.com/office/drawing/2014/main" id="{73A506B8-4F05-47D9-8CD9-C15B49DF42C4}"/>
-              </a:ext>
-            </a:extLst>
-          </p:cNvPr>
-          <p:cNvPicPr>
-            <a:picLocks noChangeAspect="1" noChangeArrowheads="1"/>
-          </p:cNvPicPr>
-          <p:nvPr/>
-        </p:nvPicPr>
-        <p:blipFill>
-          <a:blip r:embed="rId3">
-            <a:extLst>
-              <a:ext uri="{28A0092B-C50C-407E-A947-70E740481C1C}">
-                <a14:useLocalDpi xmlns:a14="http://schemas.microsoft.com/office/drawing/2010/main" val="0"/>
-              </a:ext>
-            </a:extLst>
-          </a:blip>
-          <a:srcRect/>
-          <a:stretch>
-            <a:fillRect/>
-          </a:stretch>
-        </p:blipFill>
-        <p:spPr bwMode="auto">
-          <a:xfrm>
-            <a:off x="8238395" y="3387676"/>
-            <a:ext cx="2554029" cy="1094584"/>
-          </a:xfrm>
-          <a:prstGeom prst="rect">
-            <a:avLst/>
-          </a:prstGeom>
-          <a:noFill/>
-          <a:extLst>
-            <a:ext uri="{909E8E84-426E-40DD-AFC4-6F175D3DCCD1}">
-              <a14:hiddenFill xmlns:a14="http://schemas.microsoft.com/office/drawing/2010/main">
-                <a:solidFill>
-                  <a:srgbClr val="FFFFFF"/>
-                </a:solidFill>
-              </a14:hiddenFill>
-            </a:ext>
-          </a:extLst>
-        </p:spPr>
-      </p:pic>
-      <p:pic>
-        <p:nvPicPr>
-          <p:cNvPr id="3078" name="Picture 6" descr="Image result for REACT framework">
-            <a:extLst>
-              <a:ext uri="{FF2B5EF4-FFF2-40B4-BE49-F238E27FC236}">
-                <a16:creationId xmlns:a16="http://schemas.microsoft.com/office/drawing/2014/main" id="{09FF42A1-A177-4013-866B-8F6E72B1CA07}"/>
-              </a:ext>
-            </a:extLst>
-          </p:cNvPr>
-          <p:cNvPicPr>
-            <a:picLocks noChangeAspect="1" noChangeArrowheads="1"/>
-          </p:cNvPicPr>
-          <p:nvPr/>
-        </p:nvPicPr>
-        <p:blipFill>
-          <a:blip r:embed="rId4">
-            <a:extLst>
-              <a:ext uri="{28A0092B-C50C-407E-A947-70E740481C1C}">
-                <a14:useLocalDpi xmlns:a14="http://schemas.microsoft.com/office/drawing/2010/main" val="0"/>
-              </a:ext>
-            </a:extLst>
-          </a:blip>
-          <a:srcRect/>
-          <a:stretch>
-            <a:fillRect/>
-          </a:stretch>
-        </p:blipFill>
-        <p:spPr bwMode="auto">
-          <a:xfrm>
-            <a:off x="8746322" y="2589124"/>
-            <a:ext cx="1538177" cy="516731"/>
-          </a:xfrm>
-          <a:prstGeom prst="rect">
-            <a:avLst/>
-          </a:prstGeom>
-          <a:noFill/>
-          <a:extLst>
-            <a:ext uri="{909E8E84-426E-40DD-AFC4-6F175D3DCCD1}">
-              <a14:hiddenFill xmlns:a14="http://schemas.microsoft.com/office/drawing/2010/main">
-                <a:solidFill>
-                  <a:srgbClr val="FFFFFF"/>
-                </a:solidFill>
-              </a14:hiddenFill>
-            </a:ext>
-          </a:extLst>
-        </p:spPr>
-      </p:pic>
-      <p:pic>
-        <p:nvPicPr>
-          <p:cNvPr id="3080" name="Picture 8" descr="Image result for JUnit">
-            <a:extLst>
-              <a:ext uri="{FF2B5EF4-FFF2-40B4-BE49-F238E27FC236}">
-                <a16:creationId xmlns:a16="http://schemas.microsoft.com/office/drawing/2014/main" id="{3637CA8F-AE5C-455E-9D96-D315D8C7074A}"/>
-              </a:ext>
-            </a:extLst>
-          </p:cNvPr>
-          <p:cNvPicPr>
-            <a:picLocks noChangeAspect="1" noChangeArrowheads="1"/>
-          </p:cNvPicPr>
-          <p:nvPr/>
-        </p:nvPicPr>
-        <p:blipFill>
-          <a:blip r:embed="rId5">
-            <a:extLst>
-              <a:ext uri="{28A0092B-C50C-407E-A947-70E740481C1C}">
-                <a14:useLocalDpi xmlns:a14="http://schemas.microsoft.com/office/drawing/2010/main" val="0"/>
-              </a:ext>
-            </a:extLst>
-          </a:blip>
-          <a:srcRect/>
-          <a:stretch>
-            <a:fillRect/>
-          </a:stretch>
-        </p:blipFill>
-        <p:spPr bwMode="auto">
-          <a:xfrm>
-            <a:off x="6638893" y="4257921"/>
-            <a:ext cx="1742189" cy="532237"/>
-          </a:xfrm>
-          <a:prstGeom prst="rect">
-            <a:avLst/>
-          </a:prstGeom>
-          <a:noFill/>
-          <a:extLst>
-            <a:ext uri="{909E8E84-426E-40DD-AFC4-6F175D3DCCD1}">
-              <a14:hiddenFill xmlns:a14="http://schemas.microsoft.com/office/drawing/2010/main">
-                <a:solidFill>
-                  <a:srgbClr val="FFFFFF"/>
-                </a:solidFill>
-              </a14:hiddenFill>
-            </a:ext>
-          </a:extLst>
-        </p:spPr>
-      </p:pic>
-      <p:pic>
-        <p:nvPicPr>
-          <p:cNvPr id="3084" name="Picture 12" descr="Image result for postgres logo transparent">
-            <a:extLst>
-              <a:ext uri="{FF2B5EF4-FFF2-40B4-BE49-F238E27FC236}">
-                <a16:creationId xmlns:a16="http://schemas.microsoft.com/office/drawing/2014/main" id="{6B17A3DC-B8F6-4334-8F27-A4C5B028EBDB}"/>
-              </a:ext>
-            </a:extLst>
-          </p:cNvPr>
-          <p:cNvPicPr>
-            <a:picLocks noChangeAspect="1" noChangeArrowheads="1"/>
-          </p:cNvPicPr>
-          <p:nvPr/>
-        </p:nvPicPr>
-        <p:blipFill>
-          <a:blip r:embed="rId6">
-            <a:extLst>
-              <a:ext uri="{28A0092B-C50C-407E-A947-70E740481C1C}">
-                <a14:useLocalDpi xmlns:a14="http://schemas.microsoft.com/office/drawing/2010/main" val="0"/>
-              </a:ext>
-            </a:extLst>
-          </a:blip>
-          <a:srcRect/>
-          <a:stretch>
-            <a:fillRect/>
-          </a:stretch>
-        </p:blipFill>
-        <p:spPr bwMode="auto">
-          <a:xfrm>
-            <a:off x="6638893" y="2380315"/>
-            <a:ext cx="1297234" cy="1442484"/>
-          </a:xfrm>
-          <a:prstGeom prst="rect">
-            <a:avLst/>
-          </a:prstGeom>
-          <a:noFill/>
-          <a:extLst>
-            <a:ext uri="{909E8E84-426E-40DD-AFC4-6F175D3DCCD1}">
-              <a14:hiddenFill xmlns:a14="http://schemas.microsoft.com/office/drawing/2010/main">
-                <a:solidFill>
-                  <a:srgbClr val="FFFFFF"/>
-                </a:solidFill>
-              </a14:hiddenFill>
-            </a:ext>
-          </a:extLst>
         </p:spPr>
       </p:pic>
     </p:spTree>
@@ -10443,7 +10119,7 @@
                                         <p:tgtEl>
                                           <p:spTgt spid="5">
                                             <p:txEl>
-                                              <p:pRg st="1" end="1"/>
+                                              <p:pRg st="2" end="2"/>
                                             </p:txEl>
                                           </p:spTgt>
                                         </p:tgtEl>
@@ -10461,7 +10137,7 @@
                                         <p:tgtEl>
                                           <p:spTgt spid="5">
                                             <p:txEl>
-                                              <p:pRg st="1" end="1"/>
+                                              <p:pRg st="2" end="2"/>
                                             </p:txEl>
                                           </p:spTgt>
                                         </p:tgtEl>
@@ -10504,7 +10180,7 @@
                                         <p:tgtEl>
                                           <p:spTgt spid="5">
                                             <p:txEl>
-                                              <p:pRg st="2" end="2"/>
+                                              <p:pRg st="4" end="4"/>
                                             </p:txEl>
                                           </p:spTgt>
                                         </p:tgtEl>
@@ -10522,7 +10198,7 @@
                                         <p:tgtEl>
                                           <p:spTgt spid="5">
                                             <p:txEl>
-                                              <p:pRg st="2" end="2"/>
+                                              <p:pRg st="4" end="4"/>
                                             </p:txEl>
                                           </p:spTgt>
                                         </p:tgtEl>
@@ -10565,7 +10241,7 @@
                                         <p:tgtEl>
                                           <p:spTgt spid="5">
                                             <p:txEl>
-                                              <p:pRg st="3" end="3"/>
+                                              <p:pRg st="6" end="6"/>
                                             </p:txEl>
                                           </p:spTgt>
                                         </p:tgtEl>
@@ -10583,68 +10259,7 @@
                                         <p:tgtEl>
                                           <p:spTgt spid="5">
                                             <p:txEl>
-                                              <p:pRg st="3" end="3"/>
-                                            </p:txEl>
-                                          </p:spTgt>
-                                        </p:tgtEl>
-                                      </p:cBhvr>
-                                    </p:animEffect>
-                                  </p:childTnLst>
-                                </p:cTn>
-                              </p:par>
-                            </p:childTnLst>
-                          </p:cTn>
-                        </p:par>
-                      </p:childTnLst>
-                    </p:cTn>
-                  </p:par>
-                  <p:par>
-                    <p:cTn id="23" fill="hold">
-                      <p:stCondLst>
-                        <p:cond delay="indefinite"/>
-                      </p:stCondLst>
-                      <p:childTnLst>
-                        <p:par>
-                          <p:cTn id="24" fill="hold">
-                            <p:stCondLst>
-                              <p:cond delay="0"/>
-                            </p:stCondLst>
-                            <p:childTnLst>
-                              <p:par>
-                                <p:cTn id="25" presetID="10" presetClass="entr" presetSubtype="0" fill="hold" grpId="0" nodeType="clickEffect">
-                                  <p:stCondLst>
-                                    <p:cond delay="0"/>
-                                  </p:stCondLst>
-                                  <p:childTnLst>
-                                    <p:set>
-                                      <p:cBhvr>
-                                        <p:cTn id="26" dur="1" fill="hold">
-                                          <p:stCondLst>
-                                            <p:cond delay="0"/>
-                                          </p:stCondLst>
-                                        </p:cTn>
-                                        <p:tgtEl>
-                                          <p:spTgt spid="5">
-                                            <p:txEl>
-                                              <p:pRg st="4" end="4"/>
-                                            </p:txEl>
-                                          </p:spTgt>
-                                        </p:tgtEl>
-                                        <p:attrNameLst>
-                                          <p:attrName>style.visibility</p:attrName>
-                                        </p:attrNameLst>
-                                      </p:cBhvr>
-                                      <p:to>
-                                        <p:strVal val="visible"/>
-                                      </p:to>
-                                    </p:set>
-                                    <p:animEffect transition="in" filter="fade">
-                                      <p:cBhvr>
-                                        <p:cTn id="27" dur="500"/>
-                                        <p:tgtEl>
-                                          <p:spTgt spid="5">
-                                            <p:txEl>
-                                              <p:pRg st="4" end="4"/>
+                                              <p:pRg st="6" end="6"/>
                                             </p:txEl>
                                           </p:spTgt>
                                         </p:tgtEl>
@@ -10798,7 +10413,7 @@
             </a:r>
             <a:r>
               <a:rPr lang="en-US" dirty="0"/>
-              <a:t> Resources for Landlord/Tenant Law</a:t>
+              <a:t> Resource for Landlord/Tenant Law</a:t>
             </a:r>
           </a:p>
         </p:txBody>
@@ -11108,89 +10723,6 @@
           <p:cNvPr id="2" name="Title 1">
             <a:extLst>
               <a:ext uri="{FF2B5EF4-FFF2-40B4-BE49-F238E27FC236}">
-                <a16:creationId xmlns:a16="http://schemas.microsoft.com/office/drawing/2014/main" id="{3D7D3EAE-706C-4B44-8C2C-AA4352FCC669}"/>
-              </a:ext>
-            </a:extLst>
-          </p:cNvPr>
-          <p:cNvSpPr>
-            <a:spLocks noGrp="1"/>
-          </p:cNvSpPr>
-          <p:nvPr>
-            <p:ph type="ctrTitle"/>
-          </p:nvPr>
-        </p:nvSpPr>
-        <p:spPr/>
-        <p:txBody>
-          <a:bodyPr/>
-          <a:lstStyle/>
-          <a:p>
-            <a:r>
-              <a:rPr lang="en-US" dirty="0"/>
-              <a:t>Demo</a:t>
-            </a:r>
-          </a:p>
-        </p:txBody>
-      </p:sp>
-      <p:sp>
-        <p:nvSpPr>
-          <p:cNvPr id="3" name="Subtitle 2">
-            <a:extLst>
-              <a:ext uri="{FF2B5EF4-FFF2-40B4-BE49-F238E27FC236}">
-                <a16:creationId xmlns:a16="http://schemas.microsoft.com/office/drawing/2014/main" id="{9E2193F8-40D3-4F92-AD22-CBD711448EE5}"/>
-              </a:ext>
-            </a:extLst>
-          </p:cNvPr>
-          <p:cNvSpPr>
-            <a:spLocks noGrp="1"/>
-          </p:cNvSpPr>
-          <p:nvPr>
-            <p:ph type="subTitle" idx="1"/>
-          </p:nvPr>
-        </p:nvSpPr>
-        <p:spPr/>
-        <p:txBody>
-          <a:bodyPr/>
-          <a:lstStyle/>
-          <a:p>
-            <a:endParaRPr lang="en-US"/>
-          </a:p>
-        </p:txBody>
-      </p:sp>
-    </p:spTree>
-    <p:extLst>
-      <p:ext uri="{BB962C8B-B14F-4D97-AF65-F5344CB8AC3E}">
-        <p14:creationId xmlns:p14="http://schemas.microsoft.com/office/powerpoint/2010/main" val="2486157659"/>
-      </p:ext>
-    </p:extLst>
-  </p:cSld>
-  <p:clrMapOvr>
-    <a:masterClrMapping/>
-  </p:clrMapOvr>
-</p:sld>
-</file>
-
-<file path=ppt/slides/slide6.xml><?xml version="1.0" encoding="utf-8"?>
-<p:sld xmlns:a="http://schemas.openxmlformats.org/drawingml/2006/main" xmlns:r="http://schemas.openxmlformats.org/officeDocument/2006/relationships" xmlns:p="http://schemas.openxmlformats.org/presentationml/2006/main">
-  <p:cSld>
-    <p:spTree>
-      <p:nvGrpSpPr>
-        <p:cNvPr id="1" name=""/>
-        <p:cNvGrpSpPr/>
-        <p:nvPr/>
-      </p:nvGrpSpPr>
-      <p:grpSpPr>
-        <a:xfrm>
-          <a:off x="0" y="0"/>
-          <a:ext cx="0" cy="0"/>
-          <a:chOff x="0" y="0"/>
-          <a:chExt cx="0" cy="0"/>
-        </a:xfrm>
-      </p:grpSpPr>
-      <p:sp>
-        <p:nvSpPr>
-          <p:cNvPr id="2" name="Title 1">
-            <a:extLst>
-              <a:ext uri="{FF2B5EF4-FFF2-40B4-BE49-F238E27FC236}">
                 <a16:creationId xmlns:a16="http://schemas.microsoft.com/office/drawing/2014/main" id="{4CE3FE0D-F61F-45D3-98C5-55C89ECDAE4C}"/>
               </a:ext>
             </a:extLst>
@@ -11269,96 +10801,6 @@
           </a:p>
         </p:txBody>
       </p:sp>
-      <p:pic>
-        <p:nvPicPr>
-          <p:cNvPr id="2050" name="Picture 2" descr="Image result for speak up clipart">
-            <a:extLst>
-              <a:ext uri="{FF2B5EF4-FFF2-40B4-BE49-F238E27FC236}">
-                <a16:creationId xmlns:a16="http://schemas.microsoft.com/office/drawing/2014/main" id="{282374A3-63CD-4D72-ABD2-4B9F1A944E5D}"/>
-              </a:ext>
-            </a:extLst>
-          </p:cNvPr>
-          <p:cNvPicPr>
-            <a:picLocks noChangeAspect="1" noChangeArrowheads="1"/>
-          </p:cNvPicPr>
-          <p:nvPr/>
-        </p:nvPicPr>
-        <p:blipFill>
-          <a:blip r:embed="rId2">
-            <a:extLst>
-              <a:ext uri="{28A0092B-C50C-407E-A947-70E740481C1C}">
-                <a14:useLocalDpi xmlns:a14="http://schemas.microsoft.com/office/drawing/2010/main" val="0"/>
-              </a:ext>
-            </a:extLst>
-          </a:blip>
-          <a:srcRect/>
-          <a:stretch>
-            <a:fillRect/>
-          </a:stretch>
-        </p:blipFill>
-        <p:spPr bwMode="auto">
-          <a:xfrm>
-            <a:off x="7788404" y="1802893"/>
-            <a:ext cx="2768342" cy="2578241"/>
-          </a:xfrm>
-          <a:prstGeom prst="rect">
-            <a:avLst/>
-          </a:prstGeom>
-          <a:noFill/>
-          <a:extLst>
-            <a:ext uri="{909E8E84-426E-40DD-AFC4-6F175D3DCCD1}">
-              <a14:hiddenFill xmlns:a14="http://schemas.microsoft.com/office/drawing/2010/main">
-                <a:solidFill>
-                  <a:srgbClr val="FFFFFF"/>
-                </a:solidFill>
-              </a14:hiddenFill>
-            </a:ext>
-          </a:extLst>
-        </p:spPr>
-      </p:pic>
-      <p:pic>
-        <p:nvPicPr>
-          <p:cNvPr id="5" name="Content Placeholder 7">
-            <a:extLst>
-              <a:ext uri="{FF2B5EF4-FFF2-40B4-BE49-F238E27FC236}">
-                <a16:creationId xmlns:a16="http://schemas.microsoft.com/office/drawing/2014/main" id="{DF47BB68-AFAE-44D1-B6ED-9B6F973F2520}"/>
-              </a:ext>
-            </a:extLst>
-          </p:cNvPr>
-          <p:cNvPicPr>
-            <a:picLocks noChangeAspect="1"/>
-          </p:cNvPicPr>
-          <p:nvPr/>
-        </p:nvPicPr>
-        <p:blipFill>
-          <a:blip r:embed="rId3">
-            <a:extLst>
-              <a:ext uri="{28A0092B-C50C-407E-A947-70E740481C1C}">
-                <a14:useLocalDpi xmlns:a14="http://schemas.microsoft.com/office/drawing/2010/main" val="0"/>
-              </a:ext>
-            </a:extLst>
-          </a:blip>
-          <a:stretch>
-            <a:fillRect/>
-          </a:stretch>
-        </p:blipFill>
-        <p:spPr>
-          <a:xfrm>
-            <a:off x="6629400" y="5113111"/>
-            <a:ext cx="4800600" cy="1249589"/>
-          </a:xfrm>
-          <a:prstGeom prst="rect">
-            <a:avLst/>
-          </a:prstGeom>
-          <a:effectLst>
-            <a:outerShdw blurRad="50800" dist="38100" dir="8100000" algn="tr" rotWithShape="0">
-              <a:prstClr val="black">
-                <a:alpha val="40000"/>
-              </a:prstClr>
-            </a:outerShdw>
-          </a:effectLst>
-        </p:spPr>
-      </p:pic>
     </p:spTree>
     <p:extLst>
       <p:ext uri="{BB962C8B-B14F-4D97-AF65-F5344CB8AC3E}">
@@ -11372,524 +10814,7 @@
 </p:sld>
 </file>
 
-<file path=ppt/slides/slide7.xml><?xml version="1.0" encoding="utf-8"?>
-<p:sld xmlns:a="http://schemas.openxmlformats.org/drawingml/2006/main" xmlns:r="http://schemas.openxmlformats.org/officeDocument/2006/relationships" xmlns:p="http://schemas.openxmlformats.org/presentationml/2006/main">
-  <p:cSld>
-    <p:spTree>
-      <p:nvGrpSpPr>
-        <p:cNvPr id="1" name=""/>
-        <p:cNvGrpSpPr/>
-        <p:nvPr/>
-      </p:nvGrpSpPr>
-      <p:grpSpPr>
-        <a:xfrm>
-          <a:off x="0" y="0"/>
-          <a:ext cx="0" cy="0"/>
-          <a:chOff x="0" y="0"/>
-          <a:chExt cx="0" cy="0"/>
-        </a:xfrm>
-      </p:grpSpPr>
-      <p:sp>
-        <p:nvSpPr>
-          <p:cNvPr id="2" name="Title 1">
-            <a:extLst>
-              <a:ext uri="{FF2B5EF4-FFF2-40B4-BE49-F238E27FC236}">
-                <a16:creationId xmlns:a16="http://schemas.microsoft.com/office/drawing/2014/main" id="{B7E21C7C-C9E8-4CD5-984F-248E0B6726DC}"/>
-              </a:ext>
-            </a:extLst>
-          </p:cNvPr>
-          <p:cNvSpPr>
-            <a:spLocks noGrp="1"/>
-          </p:cNvSpPr>
-          <p:nvPr>
-            <p:ph type="title"/>
-          </p:nvPr>
-        </p:nvSpPr>
-        <p:spPr/>
-        <p:txBody>
-          <a:bodyPr/>
-          <a:lstStyle/>
-          <a:p>
-            <a:r>
-              <a:rPr lang="en-US" dirty="0"/>
-              <a:t>Project Reflection</a:t>
-            </a:r>
-          </a:p>
-        </p:txBody>
-      </p:sp>
-      <p:sp>
-        <p:nvSpPr>
-          <p:cNvPr id="3" name="Content Placeholder 2">
-            <a:extLst>
-              <a:ext uri="{FF2B5EF4-FFF2-40B4-BE49-F238E27FC236}">
-                <a16:creationId xmlns:a16="http://schemas.microsoft.com/office/drawing/2014/main" id="{C142EBF9-7BF1-4F4C-9B38-794B49CBA035}"/>
-              </a:ext>
-            </a:extLst>
-          </p:cNvPr>
-          <p:cNvSpPr>
-            <a:spLocks noGrp="1"/>
-          </p:cNvSpPr>
-          <p:nvPr>
-            <p:ph idx="1"/>
-          </p:nvPr>
-        </p:nvSpPr>
-        <p:spPr/>
-        <p:txBody>
-          <a:bodyPr/>
-          <a:lstStyle/>
-          <a:p>
-            <a:r>
-              <a:rPr lang="en-US" dirty="0"/>
-              <a:t>Sprint 1: </a:t>
-            </a:r>
-          </a:p>
-          <a:p>
-            <a:pPr lvl="1"/>
-            <a:r>
-              <a:rPr lang="en-US" dirty="0"/>
-              <a:t>Project setup &amp; Database creation</a:t>
-            </a:r>
-          </a:p>
-          <a:p>
-            <a:r>
-              <a:rPr lang="en-US" dirty="0"/>
-              <a:t>Sprint 2:</a:t>
-            </a:r>
-          </a:p>
-          <a:p>
-            <a:pPr lvl="1"/>
-            <a:r>
-              <a:rPr lang="en-US" dirty="0"/>
-              <a:t>Front-end graphical user interface developed</a:t>
-            </a:r>
-          </a:p>
-          <a:p>
-            <a:r>
-              <a:rPr lang="en-US" dirty="0"/>
-              <a:t>Sprint 3:</a:t>
-            </a:r>
-          </a:p>
-          <a:p>
-            <a:pPr lvl="1"/>
-            <a:r>
-              <a:rPr lang="en-US" dirty="0"/>
-              <a:t>Middleware API created</a:t>
-            </a:r>
-          </a:p>
-          <a:p>
-            <a:r>
-              <a:rPr lang="en-US" dirty="0"/>
-              <a:t>Sprint 4:</a:t>
-            </a:r>
-          </a:p>
-          <a:p>
-            <a:pPr lvl="1"/>
-            <a:r>
-              <a:rPr lang="en-US" dirty="0"/>
-              <a:t>Previous development integration &amp; QA/Testing</a:t>
-            </a:r>
-          </a:p>
-        </p:txBody>
-      </p:sp>
-      <p:pic>
-        <p:nvPicPr>
-          <p:cNvPr id="1026" name="Picture 2" descr="Image result for clipart checkboxes">
-            <a:extLst>
-              <a:ext uri="{FF2B5EF4-FFF2-40B4-BE49-F238E27FC236}">
-                <a16:creationId xmlns:a16="http://schemas.microsoft.com/office/drawing/2014/main" id="{98C41F0C-9500-498F-AD70-91E0078F0C09}"/>
-              </a:ext>
-            </a:extLst>
-          </p:cNvPr>
-          <p:cNvPicPr>
-            <a:picLocks noChangeAspect="1" noChangeArrowheads="1"/>
-          </p:cNvPicPr>
-          <p:nvPr/>
-        </p:nvPicPr>
-        <p:blipFill>
-          <a:blip r:embed="rId2">
-            <a:extLst>
-              <a:ext uri="{28A0092B-C50C-407E-A947-70E740481C1C}">
-                <a14:useLocalDpi xmlns:a14="http://schemas.microsoft.com/office/drawing/2010/main" val="0"/>
-              </a:ext>
-            </a:extLst>
-          </a:blip>
-          <a:srcRect/>
-          <a:stretch>
-            <a:fillRect/>
-          </a:stretch>
-        </p:blipFill>
-        <p:spPr bwMode="auto">
-          <a:xfrm>
-            <a:off x="7269221" y="1531171"/>
-            <a:ext cx="3098948" cy="2724239"/>
-          </a:xfrm>
-          <a:prstGeom prst="rect">
-            <a:avLst/>
-          </a:prstGeom>
-          <a:noFill/>
-          <a:extLst>
-            <a:ext uri="{909E8E84-426E-40DD-AFC4-6F175D3DCCD1}">
-              <a14:hiddenFill xmlns:a14="http://schemas.microsoft.com/office/drawing/2010/main">
-                <a:solidFill>
-                  <a:srgbClr val="FFFFFF"/>
-                </a:solidFill>
-              </a14:hiddenFill>
-            </a:ext>
-          </a:extLst>
-        </p:spPr>
-      </p:pic>
-      <p:pic>
-        <p:nvPicPr>
-          <p:cNvPr id="5" name="Content Placeholder 7">
-            <a:extLst>
-              <a:ext uri="{FF2B5EF4-FFF2-40B4-BE49-F238E27FC236}">
-                <a16:creationId xmlns:a16="http://schemas.microsoft.com/office/drawing/2014/main" id="{53C5CEE3-0633-47B2-834D-526F4970743A}"/>
-              </a:ext>
-            </a:extLst>
-          </p:cNvPr>
-          <p:cNvPicPr>
-            <a:picLocks noChangeAspect="1"/>
-          </p:cNvPicPr>
-          <p:nvPr/>
-        </p:nvPicPr>
-        <p:blipFill>
-          <a:blip r:embed="rId3">
-            <a:extLst>
-              <a:ext uri="{28A0092B-C50C-407E-A947-70E740481C1C}">
-                <a14:useLocalDpi xmlns:a14="http://schemas.microsoft.com/office/drawing/2010/main" val="0"/>
-              </a:ext>
-            </a:extLst>
-          </a:blip>
-          <a:stretch>
-            <a:fillRect/>
-          </a:stretch>
-        </p:blipFill>
-        <p:spPr>
-          <a:xfrm>
-            <a:off x="6629400" y="5113111"/>
-            <a:ext cx="4800600" cy="1249589"/>
-          </a:xfrm>
-          <a:prstGeom prst="rect">
-            <a:avLst/>
-          </a:prstGeom>
-          <a:effectLst>
-            <a:outerShdw blurRad="50800" dist="38100" dir="8100000" algn="tr" rotWithShape="0">
-              <a:prstClr val="black">
-                <a:alpha val="40000"/>
-              </a:prstClr>
-            </a:outerShdw>
-          </a:effectLst>
-        </p:spPr>
-      </p:pic>
-    </p:spTree>
-    <p:extLst>
-      <p:ext uri="{BB962C8B-B14F-4D97-AF65-F5344CB8AC3E}">
-        <p14:creationId xmlns:p14="http://schemas.microsoft.com/office/powerpoint/2010/main" val="1946155254"/>
-      </p:ext>
-    </p:extLst>
-  </p:cSld>
-  <p:clrMapOvr>
-    <a:masterClrMapping/>
-  </p:clrMapOvr>
-</p:sld>
-</file>
-
-<file path=ppt/slides/slide8.xml><?xml version="1.0" encoding="utf-8"?>
-<p:sld xmlns:a="http://schemas.openxmlformats.org/drawingml/2006/main" xmlns:r="http://schemas.openxmlformats.org/officeDocument/2006/relationships" xmlns:p="http://schemas.openxmlformats.org/presentationml/2006/main">
-  <p:cSld>
-    <p:spTree>
-      <p:nvGrpSpPr>
-        <p:cNvPr id="1" name=""/>
-        <p:cNvGrpSpPr/>
-        <p:nvPr/>
-      </p:nvGrpSpPr>
-      <p:grpSpPr>
-        <a:xfrm>
-          <a:off x="0" y="0"/>
-          <a:ext cx="0" cy="0"/>
-          <a:chOff x="0" y="0"/>
-          <a:chExt cx="0" cy="0"/>
-        </a:xfrm>
-      </p:grpSpPr>
-      <p:sp>
-        <p:nvSpPr>
-          <p:cNvPr id="2" name="Title 1">
-            <a:extLst>
-              <a:ext uri="{FF2B5EF4-FFF2-40B4-BE49-F238E27FC236}">
-                <a16:creationId xmlns:a16="http://schemas.microsoft.com/office/drawing/2014/main" id="{73796899-DAB3-494A-98EE-6D8675752523}"/>
-              </a:ext>
-            </a:extLst>
-          </p:cNvPr>
-          <p:cNvSpPr>
-            <a:spLocks noGrp="1"/>
-          </p:cNvSpPr>
-          <p:nvPr>
-            <p:ph type="title"/>
-          </p:nvPr>
-        </p:nvSpPr>
-        <p:spPr/>
-        <p:txBody>
-          <a:bodyPr/>
-          <a:lstStyle/>
-          <a:p>
-            <a:r>
-              <a:rPr lang="en-US" dirty="0"/>
-              <a:t>Project reflection</a:t>
-            </a:r>
-          </a:p>
-        </p:txBody>
-      </p:sp>
-      <p:sp>
-        <p:nvSpPr>
-          <p:cNvPr id="3" name="Content Placeholder 2">
-            <a:extLst>
-              <a:ext uri="{FF2B5EF4-FFF2-40B4-BE49-F238E27FC236}">
-                <a16:creationId xmlns:a16="http://schemas.microsoft.com/office/drawing/2014/main" id="{1F5FCD82-D14D-4E3B-95CB-BAC77912A17A}"/>
-              </a:ext>
-            </a:extLst>
-          </p:cNvPr>
-          <p:cNvSpPr>
-            <a:spLocks noGrp="1"/>
-          </p:cNvSpPr>
-          <p:nvPr>
-            <p:ph idx="1"/>
-          </p:nvPr>
-        </p:nvSpPr>
-        <p:spPr>
-          <a:xfrm>
-            <a:off x="7044101" y="3055381"/>
-            <a:ext cx="3126094" cy="1216404"/>
-          </a:xfrm>
-        </p:spPr>
-        <p:txBody>
-          <a:bodyPr>
-            <a:noAutofit/>
-          </a:bodyPr>
-          <a:lstStyle/>
-          <a:p>
-            <a:r>
-              <a:rPr lang="en-US" sz="2400" dirty="0">
-                <a:solidFill>
-                  <a:schemeClr val="tx1"/>
-                </a:solidFill>
-              </a:rPr>
-              <a:t>Integration challenges</a:t>
-            </a:r>
-          </a:p>
-          <a:p>
-            <a:r>
-              <a:rPr lang="en-US" sz="2400" dirty="0">
-                <a:solidFill>
-                  <a:schemeClr val="tx1"/>
-                </a:solidFill>
-              </a:rPr>
-              <a:t>Trello organization</a:t>
-            </a:r>
-          </a:p>
-        </p:txBody>
-      </p:sp>
-      <p:sp>
-        <p:nvSpPr>
-          <p:cNvPr id="4" name="TextBox 3">
-            <a:extLst>
-              <a:ext uri="{FF2B5EF4-FFF2-40B4-BE49-F238E27FC236}">
-                <a16:creationId xmlns:a16="http://schemas.microsoft.com/office/drawing/2014/main" id="{A304C36F-F012-40B4-9077-E7C13CF63058}"/>
-              </a:ext>
-            </a:extLst>
-          </p:cNvPr>
-          <p:cNvSpPr txBox="1"/>
-          <p:nvPr/>
-        </p:nvSpPr>
-        <p:spPr>
-          <a:xfrm>
-            <a:off x="1485368" y="3055381"/>
-            <a:ext cx="3974742" cy="1200329"/>
-          </a:xfrm>
-          <a:prstGeom prst="rect">
-            <a:avLst/>
-          </a:prstGeom>
-          <a:noFill/>
-        </p:spPr>
-        <p:txBody>
-          <a:bodyPr wrap="none" rtlCol="0">
-            <a:spAutoFit/>
-          </a:bodyPr>
-          <a:lstStyle/>
-          <a:p>
-            <a:pPr marL="285750" indent="-285750">
-              <a:buFont typeface="Arial" panose="020B0604020202020204" pitchFamily="34" charset="0"/>
-              <a:buChar char="•"/>
-            </a:pPr>
-            <a:r>
-              <a:rPr lang="en-US" sz="2400" dirty="0"/>
-              <a:t>Familiar technology stack</a:t>
-            </a:r>
-          </a:p>
-          <a:p>
-            <a:pPr marL="285750" indent="-285750">
-              <a:buFont typeface="Arial" panose="020B0604020202020204" pitchFamily="34" charset="0"/>
-              <a:buChar char="•"/>
-            </a:pPr>
-            <a:r>
-              <a:rPr lang="en-US" sz="2400" dirty="0"/>
-              <a:t>Work at our own pace</a:t>
-            </a:r>
-          </a:p>
-          <a:p>
-            <a:pPr marL="285750" indent="-285750">
-              <a:buFont typeface="Arial" panose="020B0604020202020204" pitchFamily="34" charset="0"/>
-              <a:buChar char="•"/>
-            </a:pPr>
-            <a:r>
-              <a:rPr lang="en-US" sz="2400" dirty="0"/>
-              <a:t>Full product design freedom</a:t>
-            </a:r>
-          </a:p>
-        </p:txBody>
-      </p:sp>
-      <p:sp>
-        <p:nvSpPr>
-          <p:cNvPr id="5" name="TextBox 4">
-            <a:extLst>
-              <a:ext uri="{FF2B5EF4-FFF2-40B4-BE49-F238E27FC236}">
-                <a16:creationId xmlns:a16="http://schemas.microsoft.com/office/drawing/2014/main" id="{6E45F526-CECD-42FD-B5E1-969D6F973932}"/>
-              </a:ext>
-            </a:extLst>
-          </p:cNvPr>
-          <p:cNvSpPr txBox="1"/>
-          <p:nvPr/>
-        </p:nvSpPr>
-        <p:spPr>
-          <a:xfrm>
-            <a:off x="8016475" y="2593714"/>
-            <a:ext cx="1181345" cy="461665"/>
-          </a:xfrm>
-          <a:prstGeom prst="rect">
-            <a:avLst/>
-          </a:prstGeom>
-          <a:noFill/>
-        </p:spPr>
-        <p:txBody>
-          <a:bodyPr wrap="square" rtlCol="0">
-            <a:spAutoFit/>
-          </a:bodyPr>
-          <a:lstStyle/>
-          <a:p>
-            <a:r>
-              <a:rPr lang="en-US" sz="2400" u="sng" dirty="0">
-                <a:solidFill>
-                  <a:schemeClr val="tx1">
-                    <a:lumMod val="65000"/>
-                    <a:lumOff val="35000"/>
-                  </a:schemeClr>
-                </a:solidFill>
-              </a:rPr>
-              <a:t>Failures</a:t>
-            </a:r>
-            <a:endParaRPr lang="en-US" u="sng" dirty="0">
-              <a:solidFill>
-                <a:schemeClr val="tx1">
-                  <a:lumMod val="65000"/>
-                  <a:lumOff val="35000"/>
-                </a:schemeClr>
-              </a:solidFill>
-            </a:endParaRPr>
-          </a:p>
-        </p:txBody>
-      </p:sp>
-      <p:sp>
-        <p:nvSpPr>
-          <p:cNvPr id="6" name="TextBox 5">
-            <a:extLst>
-              <a:ext uri="{FF2B5EF4-FFF2-40B4-BE49-F238E27FC236}">
-                <a16:creationId xmlns:a16="http://schemas.microsoft.com/office/drawing/2014/main" id="{63CEAFBF-DB44-43DD-A599-6546C19B5A4B}"/>
-              </a:ext>
-            </a:extLst>
-          </p:cNvPr>
-          <p:cNvSpPr txBox="1"/>
-          <p:nvPr/>
-        </p:nvSpPr>
-        <p:spPr>
-          <a:xfrm flipH="1">
-            <a:off x="2760113" y="2593715"/>
-            <a:ext cx="1425251" cy="461665"/>
-          </a:xfrm>
-          <a:prstGeom prst="rect">
-            <a:avLst/>
-          </a:prstGeom>
-          <a:noFill/>
-        </p:spPr>
-        <p:txBody>
-          <a:bodyPr wrap="square" rtlCol="0">
-            <a:spAutoFit/>
-          </a:bodyPr>
-          <a:lstStyle/>
-          <a:p>
-            <a:r>
-              <a:rPr lang="en-US" sz="2400" u="sng" dirty="0"/>
-              <a:t>Successes</a:t>
-            </a:r>
-            <a:endParaRPr lang="en-US" u="sng" dirty="0"/>
-          </a:p>
-        </p:txBody>
-      </p:sp>
-      <p:pic>
-        <p:nvPicPr>
-          <p:cNvPr id="7" name="Content Placeholder 7">
-            <a:extLst>
-              <a:ext uri="{FF2B5EF4-FFF2-40B4-BE49-F238E27FC236}">
-                <a16:creationId xmlns:a16="http://schemas.microsoft.com/office/drawing/2014/main" id="{8DA6CBDE-19A4-4A41-9D43-6E14B3ED012F}"/>
-              </a:ext>
-            </a:extLst>
-          </p:cNvPr>
-          <p:cNvPicPr>
-            <a:picLocks noChangeAspect="1"/>
-          </p:cNvPicPr>
-          <p:nvPr/>
-        </p:nvPicPr>
-        <p:blipFill>
-          <a:blip r:embed="rId2">
-            <a:extLst>
-              <a:ext uri="{28A0092B-C50C-407E-A947-70E740481C1C}">
-                <a14:useLocalDpi xmlns:a14="http://schemas.microsoft.com/office/drawing/2010/main" val="0"/>
-              </a:ext>
-            </a:extLst>
-          </a:blip>
-          <a:stretch>
-            <a:fillRect/>
-          </a:stretch>
-        </p:blipFill>
-        <p:spPr>
-          <a:xfrm>
-            <a:off x="6629400" y="5113111"/>
-            <a:ext cx="4800600" cy="1249589"/>
-          </a:xfrm>
-          <a:prstGeom prst="rect">
-            <a:avLst/>
-          </a:prstGeom>
-          <a:effectLst>
-            <a:outerShdw blurRad="50800" dist="38100" dir="8100000" algn="tr" rotWithShape="0">
-              <a:prstClr val="black">
-                <a:alpha val="40000"/>
-              </a:prstClr>
-            </a:outerShdw>
-          </a:effectLst>
-        </p:spPr>
-      </p:pic>
-    </p:spTree>
-    <p:extLst>
-      <p:ext uri="{BB962C8B-B14F-4D97-AF65-F5344CB8AC3E}">
-        <p14:creationId xmlns:p14="http://schemas.microsoft.com/office/powerpoint/2010/main" val="1015099582"/>
-      </p:ext>
-    </p:extLst>
-  </p:cSld>
-  <p:clrMapOvr>
-    <a:masterClrMapping/>
-  </p:clrMapOvr>
-</p:sld>
-</file>
-
-<file path=ppt/slides/slide9.xml><?xml version="1.0" encoding="utf-8"?>
+<file path=ppt/slides/slide6.xml><?xml version="1.0" encoding="utf-8"?>
 <p:sld xmlns:a="http://schemas.openxmlformats.org/drawingml/2006/main" xmlns:r="http://schemas.openxmlformats.org/officeDocument/2006/relationships" xmlns:p="http://schemas.openxmlformats.org/presentationml/2006/main">
   <p:cSld>
     <p:spTree>

</xml_diff>